<commit_message>
Minor fixes to git part 2 slides
</commit_message>
<xml_diff>
--- a/2_collaboration/git_collaboration.pptx
+++ b/2_collaboration/git_collaboration.pptx
@@ -259,7 +259,7 @@
           <a:p>
             <a:fld id="{3BADDCAA-88FC-44D4-A91A-DD0530AB88E0}" type="datetimeFigureOut">
               <a:rPr lang="en-NL" smtClean="0"/>
-              <a:t>09/12/2024</a:t>
+              <a:t>10/12/2024</a:t>
             </a:fld>
             <a:endParaRPr lang="en-NL"/>
           </a:p>
@@ -1470,7 +1470,18 @@
               <a:tabLst/>
               <a:defRPr/>
             </a:pPr>
-            <a:endParaRPr lang="nl-NL" dirty="0"/>
+            <a:r>
+              <a:rPr lang="nl-NL" dirty="0"/>
+              <a:t>Demo: GH: </a:t>
+            </a:r>
+            <a:r>
+              <a:rPr lang="nl-NL" dirty="0" err="1"/>
+              <a:t>create</a:t>
+            </a:r>
+            <a:r>
+              <a:rPr lang="nl-NL" dirty="0"/>
+              <a:t> workflow.</a:t>
+            </a:r>
           </a:p>
         </p:txBody>
       </p:sp>
@@ -1720,18 +1731,7 @@
               <a:tabLst/>
               <a:defRPr/>
             </a:pPr>
-            <a:r>
-              <a:rPr lang="nl-NL" dirty="0"/>
-              <a:t>Demo: GH: </a:t>
-            </a:r>
-            <a:r>
-              <a:rPr lang="nl-NL" dirty="0" err="1"/>
-              <a:t>create</a:t>
-            </a:r>
-            <a:r>
-              <a:rPr lang="nl-NL" dirty="0"/>
-              <a:t> workflow.</a:t>
-            </a:r>
+            <a:endParaRPr lang="nl-NL" dirty="0"/>
           </a:p>
         </p:txBody>
       </p:sp>
@@ -3359,6 +3359,14 @@
               <a:tabLst/>
               <a:defRPr/>
             </a:pPr>
+            <a:r>
+              <a:rPr lang="nl-NL" dirty="0"/>
+              <a:t>Demo: AD: </a:t>
+            </a:r>
+            <a:r>
+              <a:rPr lang="nl-NL" dirty="0" err="1"/>
+              <a:t>pipelines</a:t>
+            </a:r>
             <a:endParaRPr lang="nl-NL" dirty="0"/>
           </a:p>
         </p:txBody>
@@ -3609,14 +3617,6 @@
               <a:tabLst/>
               <a:defRPr/>
             </a:pPr>
-            <a:r>
-              <a:rPr lang="nl-NL" dirty="0"/>
-              <a:t>Demo: AD: </a:t>
-            </a:r>
-            <a:r>
-              <a:rPr lang="nl-NL" dirty="0" err="1"/>
-              <a:t>pipelines</a:t>
-            </a:r>
             <a:endParaRPr lang="nl-NL" dirty="0"/>
           </a:p>
         </p:txBody>
@@ -4850,7 +4850,7 @@
           <a:p>
             <a:fld id="{0EBB069A-003F-4FC0-8534-236B0C5C7B5F}" type="datetimeFigureOut">
               <a:rPr lang="en-NL" smtClean="0"/>
-              <a:t>09/12/2024</a:t>
+              <a:t>10/12/2024</a:t>
             </a:fld>
             <a:endParaRPr lang="en-NL"/>
           </a:p>
@@ -5050,7 +5050,7 @@
           <a:p>
             <a:fld id="{0EBB069A-003F-4FC0-8534-236B0C5C7B5F}" type="datetimeFigureOut">
               <a:rPr lang="en-NL" smtClean="0"/>
-              <a:t>09/12/2024</a:t>
+              <a:t>10/12/2024</a:t>
             </a:fld>
             <a:endParaRPr lang="en-NL"/>
           </a:p>
@@ -5260,7 +5260,7 @@
           <a:p>
             <a:fld id="{0EBB069A-003F-4FC0-8534-236B0C5C7B5F}" type="datetimeFigureOut">
               <a:rPr lang="en-NL" smtClean="0"/>
-              <a:t>09/12/2024</a:t>
+              <a:t>10/12/2024</a:t>
             </a:fld>
             <a:endParaRPr lang="en-NL"/>
           </a:p>
@@ -5460,7 +5460,7 @@
           <a:p>
             <a:fld id="{0EBB069A-003F-4FC0-8534-236B0C5C7B5F}" type="datetimeFigureOut">
               <a:rPr lang="en-NL" smtClean="0"/>
-              <a:t>09/12/2024</a:t>
+              <a:t>10/12/2024</a:t>
             </a:fld>
             <a:endParaRPr lang="en-NL"/>
           </a:p>
@@ -5736,7 +5736,7 @@
           <a:p>
             <a:fld id="{0EBB069A-003F-4FC0-8534-236B0C5C7B5F}" type="datetimeFigureOut">
               <a:rPr lang="en-NL" smtClean="0"/>
-              <a:t>09/12/2024</a:t>
+              <a:t>10/12/2024</a:t>
             </a:fld>
             <a:endParaRPr lang="en-NL"/>
           </a:p>
@@ -6004,7 +6004,7 @@
           <a:p>
             <a:fld id="{0EBB069A-003F-4FC0-8534-236B0C5C7B5F}" type="datetimeFigureOut">
               <a:rPr lang="en-NL" smtClean="0"/>
-              <a:t>09/12/2024</a:t>
+              <a:t>10/12/2024</a:t>
             </a:fld>
             <a:endParaRPr lang="en-NL"/>
           </a:p>
@@ -6419,7 +6419,7 @@
           <a:p>
             <a:fld id="{0EBB069A-003F-4FC0-8534-236B0C5C7B5F}" type="datetimeFigureOut">
               <a:rPr lang="en-NL" smtClean="0"/>
-              <a:t>09/12/2024</a:t>
+              <a:t>10/12/2024</a:t>
             </a:fld>
             <a:endParaRPr lang="en-NL"/>
           </a:p>
@@ -6561,7 +6561,7 @@
           <a:p>
             <a:fld id="{0EBB069A-003F-4FC0-8534-236B0C5C7B5F}" type="datetimeFigureOut">
               <a:rPr lang="en-NL" smtClean="0"/>
-              <a:t>09/12/2024</a:t>
+              <a:t>10/12/2024</a:t>
             </a:fld>
             <a:endParaRPr lang="en-NL"/>
           </a:p>
@@ -6674,7 +6674,7 @@
           <a:p>
             <a:fld id="{0EBB069A-003F-4FC0-8534-236B0C5C7B5F}" type="datetimeFigureOut">
               <a:rPr lang="en-NL" smtClean="0"/>
-              <a:t>09/12/2024</a:t>
+              <a:t>10/12/2024</a:t>
             </a:fld>
             <a:endParaRPr lang="en-NL"/>
           </a:p>
@@ -6987,7 +6987,7 @@
           <a:p>
             <a:fld id="{0EBB069A-003F-4FC0-8534-236B0C5C7B5F}" type="datetimeFigureOut">
               <a:rPr lang="en-NL" smtClean="0"/>
-              <a:t>09/12/2024</a:t>
+              <a:t>10/12/2024</a:t>
             </a:fld>
             <a:endParaRPr lang="en-NL"/>
           </a:p>
@@ -7276,7 +7276,7 @@
           <a:p>
             <a:fld id="{0EBB069A-003F-4FC0-8534-236B0C5C7B5F}" type="datetimeFigureOut">
               <a:rPr lang="en-NL" smtClean="0"/>
-              <a:t>09/12/2024</a:t>
+              <a:t>10/12/2024</a:t>
             </a:fld>
             <a:endParaRPr lang="en-NL"/>
           </a:p>
@@ -7519,7 +7519,7 @@
           <a:p>
             <a:fld id="{0EBB069A-003F-4FC0-8534-236B0C5C7B5F}" type="datetimeFigureOut">
               <a:rPr lang="en-NL" smtClean="0"/>
-              <a:t>09/12/2024</a:t>
+              <a:t>10/12/2024</a:t>
             </a:fld>
             <a:endParaRPr lang="en-NL"/>
           </a:p>
@@ -8934,8 +8934,8 @@
         </p:nvSpPr>
         <p:spPr>
           <a:xfrm>
-            <a:off x="838199" y="1456267"/>
-            <a:ext cx="7515498" cy="4720696"/>
+            <a:off x="838198" y="1456267"/>
+            <a:ext cx="7802881" cy="4720696"/>
           </a:xfrm>
           <a:prstGeom prst="rect">
             <a:avLst/>
@@ -9216,7 +9216,7 @@
                 <a:latin typeface="Courier New" panose="02070309020205020404" pitchFamily="49" charset="0"/>
                 <a:cs typeface="Courier New" panose="02070309020205020404" pitchFamily="49" charset="0"/>
               </a:rPr>
-              <a:t>git </a:t>
+              <a:t>git remote </a:t>
             </a:r>
             <a:r>
               <a:rPr lang="nl-NL" sz="1600" dirty="0" err="1">
@@ -9230,7 +9230,7 @@
                 <a:latin typeface="Courier New" panose="02070309020205020404" pitchFamily="49" charset="0"/>
                 <a:cs typeface="Courier New" panose="02070309020205020404" pitchFamily="49" charset="0"/>
               </a:rPr>
-              <a:t> remote &lt;naam&gt; &lt;remote URL&gt;</a:t>
+              <a:t> &lt;naam&gt; &lt;remote URL&gt;</a:t>
             </a:r>
           </a:p>
           <a:p>
@@ -9249,7 +9249,7 @@
                 <a:latin typeface="Courier New" panose="02070309020205020404" pitchFamily="49" charset="0"/>
                 <a:cs typeface="Courier New" panose="02070309020205020404" pitchFamily="49" charset="0"/>
               </a:rPr>
-              <a:t>git </a:t>
+              <a:t>git remote </a:t>
             </a:r>
             <a:r>
               <a:rPr lang="nl-NL" sz="1600" dirty="0" err="1">
@@ -9263,7 +9263,7 @@
                 <a:latin typeface="Courier New" panose="02070309020205020404" pitchFamily="49" charset="0"/>
                 <a:cs typeface="Courier New" panose="02070309020205020404" pitchFamily="49" charset="0"/>
               </a:rPr>
-              <a:t> remote </a:t>
+              <a:t> </a:t>
             </a:r>
             <a:r>
               <a:rPr lang="nl-NL" sz="1600" dirty="0" err="1">
@@ -9277,7 +9277,7 @@
                 <a:latin typeface="Courier New" panose="02070309020205020404" pitchFamily="49" charset="0"/>
                 <a:cs typeface="Courier New" panose="02070309020205020404" pitchFamily="49" charset="0"/>
               </a:rPr>
-              <a:t> https://github.com/&lt;user&gt;/&lt;repo&gt;</a:t>
+              <a:t> https://github.com/&lt;user&gt;/pig-latin.git</a:t>
             </a:r>
           </a:p>
           <a:p>
@@ -14925,6 +14925,41 @@
           </a:p>
         </p:txBody>
       </p:sp>
+      <p:pic>
+        <p:nvPicPr>
+          <p:cNvPr id="4" name="Picture 3">
+            <a:extLst>
+              <a:ext uri="{FF2B5EF4-FFF2-40B4-BE49-F238E27FC236}">
+                <a16:creationId xmlns:a16="http://schemas.microsoft.com/office/drawing/2014/main" id="{463F8847-D293-954D-A79A-B3882FA88589}"/>
+              </a:ext>
+            </a:extLst>
+          </p:cNvPr>
+          <p:cNvPicPr>
+            <a:picLocks noChangeAspect="1"/>
+          </p:cNvPicPr>
+          <p:nvPr/>
+        </p:nvPicPr>
+        <p:blipFill>
+          <a:blip r:embed="rId2"/>
+          <a:stretch>
+            <a:fillRect/>
+          </a:stretch>
+        </p:blipFill>
+        <p:spPr>
+          <a:xfrm>
+            <a:off x="5982768" y="3164682"/>
+            <a:ext cx="4470919" cy="3012282"/>
+          </a:xfrm>
+          <a:prstGeom prst="rect">
+            <a:avLst/>
+          </a:prstGeom>
+          <a:ln>
+            <a:solidFill>
+              <a:schemeClr val="tx1"/>
+            </a:solidFill>
+          </a:ln>
+        </p:spPr>
+      </p:pic>
     </p:spTree>
     <p:extLst>
       <p:ext uri="{BB962C8B-B14F-4D97-AF65-F5344CB8AC3E}">
@@ -16265,7 +16300,15 @@
             </a:pPr>
             <a:r>
               <a:rPr lang="nl-NL" sz="1800" dirty="0"/>
-              <a:t>Ga naar het repository.</a:t>
+              <a:t>Ga Repository &gt; Pull </a:t>
+            </a:r>
+            <a:r>
+              <a:rPr lang="nl-NL" sz="1800" dirty="0" err="1"/>
+              <a:t>Requests</a:t>
+            </a:r>
+            <a:r>
+              <a:rPr lang="nl-NL" sz="1800" dirty="0"/>
+              <a:t>.</a:t>
             </a:r>
           </a:p>
           <a:p>
@@ -16281,31 +16324,7 @@
             </a:pPr>
             <a:r>
               <a:rPr lang="nl-NL" sz="1800" dirty="0"/>
-              <a:t>Klik op [Pull </a:t>
-            </a:r>
-            <a:r>
-              <a:rPr lang="nl-NL" sz="1800" dirty="0" err="1"/>
-              <a:t>requests</a:t>
-            </a:r>
-            <a:r>
-              <a:rPr lang="nl-NL" sz="1800" dirty="0"/>
-              <a:t>] in het hoofdmenu.</a:t>
-            </a:r>
-          </a:p>
-          <a:p>
-            <a:pPr marL="342900" indent="-342900">
-              <a:lnSpc>
-                <a:spcPct val="150000"/>
-              </a:lnSpc>
-              <a:spcBef>
-                <a:spcPts val="600"/>
-              </a:spcBef>
-              <a:buFont typeface="Arial" panose="020B0604020202020204" pitchFamily="34" charset="0"/>
-              <a:buAutoNum type="arabicPeriod"/>
-            </a:pPr>
-            <a:r>
-              <a:rPr lang="nl-NL" sz="1800" dirty="0"/>
-              <a:t>Klik rechtsboven op [New pull </a:t>
+              <a:t>Klik op [New pull </a:t>
             </a:r>
             <a:r>
               <a:rPr lang="nl-NL" sz="1800" dirty="0" err="1"/>
@@ -16338,6 +16357,30 @@
             <a:r>
               <a:rPr lang="nl-NL" sz="1800" dirty="0"/>
               <a:t>.</a:t>
+            </a:r>
+          </a:p>
+          <a:p>
+            <a:pPr marL="342900" indent="-342900">
+              <a:lnSpc>
+                <a:spcPct val="150000"/>
+              </a:lnSpc>
+              <a:spcBef>
+                <a:spcPts val="600"/>
+              </a:spcBef>
+              <a:buFont typeface="Arial" panose="020B0604020202020204" pitchFamily="34" charset="0"/>
+              <a:buAutoNum type="arabicPeriod"/>
+            </a:pPr>
+            <a:r>
+              <a:rPr lang="nl-NL" sz="1800" dirty="0"/>
+              <a:t>Check of </a:t>
+            </a:r>
+            <a:r>
+              <a:rPr lang="nl-NL" sz="1800" dirty="0" err="1"/>
+              <a:t>gemerged</a:t>
+            </a:r>
+            <a:r>
+              <a:rPr lang="nl-NL" sz="1800" dirty="0"/>
+              <a:t> kan worden.</a:t>
             </a:r>
           </a:p>
           <a:p>
@@ -18187,7 +18230,7 @@
               <a:rPr lang="nl-NL" sz="1800" dirty="0">
                 <a:cs typeface="Courier New" panose="02070309020205020404" pitchFamily="49" charset="0"/>
               </a:rPr>
-              <a:t>Je wilt graag code van goede kwaliteit in je repository.</a:t>
+              <a:t>Je wilt graag code van hoge kwaliteit in je repository.</a:t>
             </a:r>
           </a:p>
           <a:p>
@@ -19205,7 +19248,7 @@
               <a:rPr lang="nl-NL" sz="1800" dirty="0">
                 <a:cs typeface="Courier New" panose="02070309020205020404" pitchFamily="49" charset="0"/>
               </a:rPr>
-              <a:t>Klik op [set up a workflow </a:t>
+              <a:t>Kies: [set up a workflow </a:t>
             </a:r>
             <a:r>
               <a:rPr lang="nl-NL" sz="1800" dirty="0" err="1">
@@ -19283,7 +19326,7 @@
               <a:rPr lang="nl-NL" sz="1800" dirty="0">
                 <a:cs typeface="Courier New" panose="02070309020205020404" pitchFamily="49" charset="0"/>
               </a:rPr>
-              <a:t>Kies bestaande workflow, bv. [Python package].</a:t>
+              <a:t>Kies bestaande workflow, bv. Python package.</a:t>
             </a:r>
           </a:p>
           <a:p>
@@ -20228,19 +20271,19 @@
               <a:rPr lang="nl-NL" sz="1800" dirty="0">
                 <a:cs typeface="Courier New" panose="02070309020205020404" pitchFamily="49" charset="0"/>
               </a:rPr>
-              <a:t>Na elke push of pull </a:t>
+              <a:t>Workflow run bij elke push of Pull </a:t>
             </a:r>
             <a:r>
               <a:rPr lang="nl-NL" sz="1800" dirty="0" err="1">
                 <a:cs typeface="Courier New" panose="02070309020205020404" pitchFamily="49" charset="0"/>
               </a:rPr>
-              <a:t>request</a:t>
+              <a:t>Request</a:t>
             </a:r>
             <a:r>
               <a:rPr lang="nl-NL" sz="1800" dirty="0">
                 <a:cs typeface="Courier New" panose="02070309020205020404" pitchFamily="49" charset="0"/>
               </a:rPr>
-              <a:t> draait de Workflow.</a:t>
+              <a:t>.</a:t>
             </a:r>
           </a:p>
           <a:p>
@@ -20258,7 +20301,7 @@
               <a:rPr lang="nl-NL" sz="1800" dirty="0">
                 <a:cs typeface="Courier New" panose="02070309020205020404" pitchFamily="49" charset="0"/>
               </a:rPr>
-              <a:t>De Workflow run krijgt de naam van de </a:t>
+              <a:t>De run krijgt de naam van de </a:t>
             </a:r>
             <a:r>
               <a:rPr lang="nl-NL" sz="1800" dirty="0" err="1">
@@ -20288,7 +20331,7 @@
               <a:rPr lang="nl-NL" sz="1800" dirty="0">
                 <a:cs typeface="Courier New" panose="02070309020205020404" pitchFamily="49" charset="0"/>
               </a:rPr>
-              <a:t>Het icoon geeft aan of de run succesvol was.</a:t>
+              <a:t>Icoon geeft aan of de run succesvol was.</a:t>
             </a:r>
           </a:p>
         </p:txBody>
@@ -20653,7 +20696,7 @@
               <a:rPr lang="nl-NL" sz="1800" dirty="0">
                 <a:cs typeface="Courier New" panose="02070309020205020404" pitchFamily="49" charset="0"/>
               </a:rPr>
-              <a:t>Klik op een run voor alle details.</a:t>
+              <a:t>Klik op een run voor alle output.</a:t>
             </a:r>
           </a:p>
         </p:txBody>
@@ -21152,13 +21195,13 @@
               <a:rPr lang="nl-NL" sz="1800" dirty="0">
                 <a:cs typeface="Courier New" panose="02070309020205020404" pitchFamily="49" charset="0"/>
               </a:rPr>
-              <a:t>Een </a:t>
+              <a:t>Een Pull </a:t>
             </a:r>
             <a:r>
               <a:rPr lang="nl-NL" sz="1800" dirty="0" err="1">
                 <a:cs typeface="Courier New" panose="02070309020205020404" pitchFamily="49" charset="0"/>
               </a:rPr>
-              <a:t>merge</a:t>
+              <a:t>Request</a:t>
             </a:r>
             <a:r>
               <a:rPr lang="nl-NL" sz="1800" dirty="0">
@@ -21197,50 +21240,20 @@
               <a:rPr lang="nl-NL" sz="1800" dirty="0">
                 <a:cs typeface="Courier New" panose="02070309020205020404" pitchFamily="49" charset="0"/>
               </a:rPr>
-              <a:t>Een </a:t>
+              <a:t>Pull </a:t>
             </a:r>
             <a:r>
               <a:rPr lang="nl-NL" sz="1800" dirty="0" err="1">
                 <a:cs typeface="Courier New" panose="02070309020205020404" pitchFamily="49" charset="0"/>
               </a:rPr>
-              <a:t>merge</a:t>
+              <a:t>Requests</a:t>
             </a:r>
             <a:r>
               <a:rPr lang="nl-NL" sz="1800" dirty="0">
                 <a:cs typeface="Courier New" panose="02070309020205020404" pitchFamily="49" charset="0"/>
               </a:rPr>
-              <a:t> die niet door de Workflow komt.</a:t>
-            </a:r>
-          </a:p>
-          <a:p>
-            <a:pPr>
-              <a:lnSpc>
-                <a:spcPct val="100000"/>
-              </a:lnSpc>
-              <a:spcBef>
-                <a:spcPts val="600"/>
-              </a:spcBef>
-              <a:buFontTx/>
-              <a:buChar char="-"/>
-            </a:pPr>
-            <a:endParaRPr lang="nl-NL" sz="1800" dirty="0">
-              <a:cs typeface="Courier New" panose="02070309020205020404" pitchFamily="49" charset="0"/>
-            </a:endParaRPr>
-          </a:p>
-          <a:p>
-            <a:pPr>
-              <a:lnSpc>
-                <a:spcPct val="100000"/>
-              </a:lnSpc>
-              <a:spcBef>
-                <a:spcPts val="600"/>
-              </a:spcBef>
-              <a:buFontTx/>
-              <a:buChar char="-"/>
-            </a:pPr>
-            <a:endParaRPr lang="nl-NL" sz="1800" dirty="0">
-              <a:cs typeface="Courier New" panose="02070309020205020404" pitchFamily="49" charset="0"/>
-            </a:endParaRPr>
+              <a:t> waarbij de Workflow faalt.</a:t>
+            </a:r>
           </a:p>
           <a:p>
             <a:pPr marL="0" indent="0">
@@ -21250,7 +21263,6 @@
               <a:spcBef>
                 <a:spcPts val="600"/>
               </a:spcBef>
-              <a:buFont typeface="Arial" panose="020B0604020202020204" pitchFamily="34" charset="0"/>
               <a:buNone/>
             </a:pPr>
             <a:endParaRPr lang="nl-NL" sz="1800" dirty="0">
@@ -21705,13 +21717,13 @@
               <a:rPr lang="nl-NL" sz="1800" dirty="0">
                 <a:cs typeface="Courier New" panose="02070309020205020404" pitchFamily="49" charset="0"/>
               </a:rPr>
-              <a:t>Een </a:t>
+              <a:t>Een Pull </a:t>
             </a:r>
             <a:r>
               <a:rPr lang="nl-NL" sz="1800" dirty="0" err="1">
                 <a:cs typeface="Courier New" panose="02070309020205020404" pitchFamily="49" charset="0"/>
               </a:rPr>
-              <a:t>merge</a:t>
+              <a:t>Request</a:t>
             </a:r>
             <a:r>
               <a:rPr lang="nl-NL" sz="1800" dirty="0">
@@ -21750,65 +21762,20 @@
               <a:rPr lang="nl-NL" sz="1800" dirty="0">
                 <a:cs typeface="Courier New" panose="02070309020205020404" pitchFamily="49" charset="0"/>
               </a:rPr>
-              <a:t>Een </a:t>
+              <a:t>Pull </a:t>
             </a:r>
             <a:r>
               <a:rPr lang="nl-NL" sz="1800" dirty="0" err="1">
                 <a:cs typeface="Courier New" panose="02070309020205020404" pitchFamily="49" charset="0"/>
               </a:rPr>
-              <a:t>merge</a:t>
+              <a:t>Requests</a:t>
             </a:r>
             <a:r>
               <a:rPr lang="nl-NL" sz="1800" dirty="0">
                 <a:cs typeface="Courier New" panose="02070309020205020404" pitchFamily="49" charset="0"/>
               </a:rPr>
-              <a:t> die niet door de Workflow komt.</a:t>
-            </a:r>
-          </a:p>
-          <a:p>
-            <a:pPr>
-              <a:lnSpc>
-                <a:spcPct val="100000"/>
-              </a:lnSpc>
-              <a:spcBef>
-                <a:spcPts val="600"/>
-              </a:spcBef>
-              <a:buFontTx/>
-              <a:buChar char="-"/>
-            </a:pPr>
-            <a:endParaRPr lang="nl-NL" sz="1800" dirty="0">
-              <a:cs typeface="Courier New" panose="02070309020205020404" pitchFamily="49" charset="0"/>
-            </a:endParaRPr>
-          </a:p>
-          <a:p>
-            <a:pPr>
-              <a:lnSpc>
-                <a:spcPct val="100000"/>
-              </a:lnSpc>
-              <a:spcBef>
-                <a:spcPts val="600"/>
-              </a:spcBef>
-              <a:buFontTx/>
-              <a:buChar char="-"/>
-            </a:pPr>
-            <a:endParaRPr lang="nl-NL" sz="1800" dirty="0">
-              <a:cs typeface="Courier New" panose="02070309020205020404" pitchFamily="49" charset="0"/>
-            </a:endParaRPr>
-          </a:p>
-          <a:p>
-            <a:pPr marL="0" indent="0">
-              <a:lnSpc>
-                <a:spcPct val="100000"/>
-              </a:lnSpc>
-              <a:spcBef>
-                <a:spcPts val="600"/>
-              </a:spcBef>
-              <a:buFont typeface="Arial" panose="020B0604020202020204" pitchFamily="34" charset="0"/>
-              <a:buNone/>
-            </a:pPr>
-            <a:endParaRPr lang="nl-NL" sz="1800" dirty="0">
-              <a:cs typeface="Courier New" panose="02070309020205020404" pitchFamily="49" charset="0"/>
-            </a:endParaRPr>
+              <a:t> waarbij de Workflow faalt.</a:t>
+            </a:r>
           </a:p>
         </p:txBody>
       </p:sp>
@@ -22445,7 +22412,7 @@
           <a:p>
             <a:r>
               <a:rPr lang="nl-NL" sz="3600" noProof="0" dirty="0"/>
-              <a:t>Issue aanmaken</a:t>
+              <a:t>Taken aanmaken</a:t>
             </a:r>
           </a:p>
         </p:txBody>
@@ -22670,37 +22637,7 @@
             </a:pPr>
             <a:r>
               <a:rPr lang="nl-NL" sz="1400" dirty="0"/>
-              <a:t>Een taak / concreet stukje werk.</a:t>
-            </a:r>
-            <a:endParaRPr lang="nl-NL" sz="1400" b="1" dirty="0"/>
-          </a:p>
-          <a:p>
-            <a:pPr marL="0" indent="0">
-              <a:lnSpc>
-                <a:spcPct val="100000"/>
-              </a:lnSpc>
-              <a:spcBef>
-                <a:spcPts val="600"/>
-              </a:spcBef>
-              <a:buFont typeface="Arial" panose="020B0604020202020204" pitchFamily="34" charset="0"/>
-              <a:buNone/>
-            </a:pPr>
-            <a:endParaRPr lang="nl-NL" sz="1400" b="1" dirty="0"/>
-          </a:p>
-          <a:p>
-            <a:pPr marL="0" indent="0">
-              <a:lnSpc>
-                <a:spcPct val="100000"/>
-              </a:lnSpc>
-              <a:spcBef>
-                <a:spcPts val="600"/>
-              </a:spcBef>
-              <a:buFont typeface="Arial" panose="020B0604020202020204" pitchFamily="34" charset="0"/>
-              <a:buNone/>
-            </a:pPr>
-            <a:r>
-              <a:rPr lang="nl-NL" sz="1400" b="1" dirty="0"/>
-              <a:t>Aanmaken via repository:</a:t>
+              <a:t>Een taak / concreet stukje werk:</a:t>
             </a:r>
           </a:p>
           <a:p>
@@ -22714,7 +22651,10 @@
               <a:buFontTx/>
               <a:buChar char="-"/>
             </a:pPr>
-            <a:endParaRPr lang="nl-NL" sz="1400" dirty="0"/>
+            <a:r>
+              <a:rPr lang="nl-NL" sz="1400" dirty="0"/>
+              <a:t>nieuwe feature.</a:t>
+            </a:r>
           </a:p>
           <a:p>
             <a:pPr>
@@ -22728,8 +22668,12 @@
               <a:buChar char="-"/>
             </a:pPr>
             <a:r>
+              <a:rPr lang="nl-NL" sz="1400" dirty="0" err="1"/>
+              <a:t>bugfix</a:t>
+            </a:r>
+            <a:r>
               <a:rPr lang="nl-NL" sz="1400" dirty="0"/>
-              <a:t>Ga naar een repository.</a:t>
+              <a:t>.</a:t>
             </a:r>
           </a:p>
           <a:p>
@@ -22745,7 +22689,36 @@
             </a:pPr>
             <a:r>
               <a:rPr lang="nl-NL" sz="1400" dirty="0"/>
-              <a:t>Klik bovenaan op Issues.</a:t>
+              <a:t>documentatie.</a:t>
+            </a:r>
+          </a:p>
+          <a:p>
+            <a:pPr marL="0" indent="0">
+              <a:lnSpc>
+                <a:spcPct val="100000"/>
+              </a:lnSpc>
+              <a:spcBef>
+                <a:spcPts val="600"/>
+              </a:spcBef>
+              <a:buFont typeface="Arial" panose="020B0604020202020204" pitchFamily="34" charset="0"/>
+              <a:buNone/>
+            </a:pPr>
+            <a:endParaRPr lang="nl-NL" sz="1400" b="1" dirty="0"/>
+          </a:p>
+          <a:p>
+            <a:pPr marL="0" indent="0">
+              <a:lnSpc>
+                <a:spcPct val="100000"/>
+              </a:lnSpc>
+              <a:spcBef>
+                <a:spcPts val="600"/>
+              </a:spcBef>
+              <a:buFont typeface="Arial" panose="020B0604020202020204" pitchFamily="34" charset="0"/>
+              <a:buNone/>
+            </a:pPr>
+            <a:r>
+              <a:rPr lang="nl-NL" sz="1400" b="1" dirty="0"/>
+              <a:t>Belangrijke elementen:</a:t>
             </a:r>
           </a:p>
           <a:p>
@@ -22761,7 +22734,7 @@
             </a:pPr>
             <a:r>
               <a:rPr lang="nl-NL" sz="1400" dirty="0"/>
-              <a:t>Klik rechtsboven op New Issue.</a:t>
+              <a:t>Duidelijke titel en omschrijving.</a:t>
             </a:r>
           </a:p>
           <a:p>
@@ -22777,7 +22750,7 @@
             </a:pPr>
             <a:r>
               <a:rPr lang="nl-NL" sz="1400" dirty="0"/>
-              <a:t>Vul alle gegevens in.</a:t>
+              <a:t>Wie gaat het oppakken.</a:t>
             </a:r>
           </a:p>
           <a:p>
@@ -22793,7 +22766,23 @@
             </a:pPr>
             <a:r>
               <a:rPr lang="nl-NL" sz="1400" dirty="0"/>
-              <a:t>Kies project in rechter menu</a:t>
+              <a:t>Labels voor type werk.</a:t>
+            </a:r>
+          </a:p>
+          <a:p>
+            <a:pPr>
+              <a:lnSpc>
+                <a:spcPct val="100000"/>
+              </a:lnSpc>
+              <a:spcBef>
+                <a:spcPts val="600"/>
+              </a:spcBef>
+              <a:buFontTx/>
+              <a:buChar char="-"/>
+            </a:pPr>
+            <a:r>
+              <a:rPr lang="nl-NL" sz="1400" dirty="0"/>
+              <a:t>Wanneer is het af?</a:t>
             </a:r>
           </a:p>
           <a:p>
@@ -22804,9 +22793,10 @@
               <a:spcBef>
                 <a:spcPts val="600"/>
               </a:spcBef>
-              <a:buNone/>
-            </a:pPr>
-            <a:endParaRPr lang="nl-NL" sz="1400" dirty="0"/>
+              <a:buFont typeface="Arial" panose="020B0604020202020204" pitchFamily="34" charset="0"/>
+              <a:buNone/>
+            </a:pPr>
+            <a:endParaRPr lang="nl-NL" sz="1400" b="1" dirty="0"/>
           </a:p>
           <a:p>
             <a:pPr marL="0" indent="0">
@@ -22876,58 +22866,6 @@
           </a:ln>
         </p:spPr>
       </p:pic>
-      <p:sp>
-        <p:nvSpPr>
-          <p:cNvPr id="6" name="Rectangle 5">
-            <a:extLst>
-              <a:ext uri="{FF2B5EF4-FFF2-40B4-BE49-F238E27FC236}">
-                <a16:creationId xmlns:a16="http://schemas.microsoft.com/office/drawing/2014/main" id="{78D13A21-0E8F-2EB0-324B-512B504F9D81}"/>
-              </a:ext>
-            </a:extLst>
-          </p:cNvPr>
-          <p:cNvSpPr/>
-          <p:nvPr/>
-        </p:nvSpPr>
-        <p:spPr>
-          <a:xfrm>
-            <a:off x="9555480" y="2429691"/>
-            <a:ext cx="1737360" cy="1208315"/>
-          </a:xfrm>
-          <a:prstGeom prst="rect">
-            <a:avLst/>
-          </a:prstGeom>
-          <a:noFill/>
-          <a:ln w="12700">
-            <a:solidFill>
-              <a:schemeClr val="accent2"/>
-            </a:solidFill>
-          </a:ln>
-        </p:spPr>
-        <p:style>
-          <a:lnRef idx="2">
-            <a:schemeClr val="accent1">
-              <a:shade val="15000"/>
-            </a:schemeClr>
-          </a:lnRef>
-          <a:fillRef idx="1">
-            <a:schemeClr val="accent1"/>
-          </a:fillRef>
-          <a:effectRef idx="0">
-            <a:schemeClr val="accent1"/>
-          </a:effectRef>
-          <a:fontRef idx="minor">
-            <a:schemeClr val="lt1"/>
-          </a:fontRef>
-        </p:style>
-        <p:txBody>
-          <a:bodyPr rtlCol="0" anchor="ctr"/>
-          <a:lstStyle/>
-          <a:p>
-            <a:pPr algn="ctr"/>
-            <a:endParaRPr lang="nl-NL"/>
-          </a:p>
-        </p:txBody>
-      </p:sp>
     </p:spTree>
     <p:extLst>
       <p:ext uri="{BB962C8B-B14F-4D97-AF65-F5344CB8AC3E}">
@@ -24541,7 +24479,7 @@
             </a:pPr>
             <a:r>
               <a:rPr lang="nl-NL" sz="2000" dirty="0"/>
-              <a:t>Je ziet alles van iedereen op de centrale server.</a:t>
+              <a:t>Alles van iedereen op de centrale server.</a:t>
             </a:r>
           </a:p>
           <a:p>
@@ -28974,6 +28912,65 @@
               <a:t>Iedereen krijgt volledige kopie van de bestanden en historie.</a:t>
             </a:r>
           </a:p>
+          <a:p>
+            <a:pPr>
+              <a:buFontTx/>
+              <a:buChar char="-"/>
+            </a:pPr>
+            <a:endParaRPr lang="nl-NL" sz="2000" dirty="0"/>
+          </a:p>
+          <a:p>
+            <a:pPr>
+              <a:buFontTx/>
+              <a:buChar char="-"/>
+            </a:pPr>
+            <a:r>
+              <a:rPr lang="nl-NL" sz="2000" dirty="0"/>
+              <a:t>Snelle lokale bewerkingen (zoals </a:t>
+            </a:r>
+            <a:r>
+              <a:rPr lang="nl-NL" sz="2000" dirty="0" err="1"/>
+              <a:t>diff</a:t>
+            </a:r>
+            <a:r>
+              <a:rPr lang="nl-NL" sz="2000" dirty="0"/>
+              <a:t>).</a:t>
+            </a:r>
+          </a:p>
+          <a:p>
+            <a:pPr>
+              <a:buFontTx/>
+              <a:buChar char="-"/>
+            </a:pPr>
+            <a:endParaRPr lang="nl-NL" sz="2000" dirty="0"/>
+          </a:p>
+          <a:p>
+            <a:pPr>
+              <a:buFontTx/>
+              <a:buChar char="-"/>
+            </a:pPr>
+            <a:r>
+              <a:rPr lang="nl-NL" sz="2000" dirty="0"/>
+              <a:t>Vrij experimenteren op lokale kopie.</a:t>
+            </a:r>
+          </a:p>
+          <a:p>
+            <a:pPr>
+              <a:buFontTx/>
+              <a:buChar char="-"/>
+            </a:pPr>
+            <a:endParaRPr lang="nl-NL" sz="2000" dirty="0"/>
+          </a:p>
+          <a:p>
+            <a:pPr>
+              <a:buFontTx/>
+              <a:buChar char="-"/>
+            </a:pPr>
+            <a:r>
+              <a:rPr lang="nl-NL" sz="2000" dirty="0"/>
+              <a:t>Server neemt nuttige branches over.</a:t>
+            </a:r>
+          </a:p>
         </p:txBody>
       </p:sp>
       <p:cxnSp>
@@ -29838,7 +29835,7 @@
               <a:rPr lang="nl-NL" sz="1800" dirty="0">
                 <a:cs typeface="Courier New" panose="02070309020205020404" pitchFamily="49" charset="0"/>
               </a:rPr>
-              <a:t>Klik op [Pipelines] in het linker menu.</a:t>
+              <a:t>Ga naar Pipelines in het menu.</a:t>
             </a:r>
           </a:p>
           <a:p>
@@ -29883,7 +29880,7 @@
               <a:rPr lang="nl-NL" sz="1800" dirty="0">
                 <a:cs typeface="Courier New" panose="02070309020205020404" pitchFamily="49" charset="0"/>
               </a:rPr>
-              <a:t> Pipeline].</a:t>
+              <a:t> Pipeline] en:</a:t>
             </a:r>
           </a:p>
           <a:p>
@@ -29902,15 +29899,15 @@
             </a:endParaRPr>
           </a:p>
           <a:p>
-            <a:pPr marL="0" indent="0">
-              <a:lnSpc>
-                <a:spcPct val="100000"/>
-              </a:lnSpc>
-              <a:spcBef>
-                <a:spcPts val="600"/>
-              </a:spcBef>
-              <a:buFont typeface="Arial" panose="020B0604020202020204" pitchFamily="34" charset="0"/>
-              <a:buNone/>
+            <a:pPr marL="342900" indent="-342900">
+              <a:lnSpc>
+                <a:spcPct val="100000"/>
+              </a:lnSpc>
+              <a:spcBef>
+                <a:spcPts val="600"/>
+              </a:spcBef>
+              <a:buFont typeface="Arial" panose="020B0604020202020204" pitchFamily="34" charset="0"/>
+              <a:buAutoNum type="arabicPeriod"/>
             </a:pPr>
             <a:r>
               <a:rPr lang="nl-NL" sz="1800" dirty="0">
@@ -29932,163 +29929,70 @@
             </a:r>
           </a:p>
           <a:p>
-            <a:pPr marL="0" indent="0">
-              <a:lnSpc>
-                <a:spcPct val="100000"/>
-              </a:lnSpc>
-              <a:spcBef>
-                <a:spcPts val="600"/>
-              </a:spcBef>
-              <a:buFont typeface="Arial" panose="020B0604020202020204" pitchFamily="34" charset="0"/>
-              <a:buNone/>
+            <a:pPr marL="342900" indent="-342900">
+              <a:lnSpc>
+                <a:spcPct val="100000"/>
+              </a:lnSpc>
+              <a:spcBef>
+                <a:spcPts val="600"/>
+              </a:spcBef>
+              <a:buFont typeface="Arial" panose="020B0604020202020204" pitchFamily="34" charset="0"/>
+              <a:buAutoNum type="arabicPeriod"/>
             </a:pPr>
             <a:endParaRPr lang="nl-NL" sz="1800" dirty="0">
               <a:cs typeface="Courier New" panose="02070309020205020404" pitchFamily="49" charset="0"/>
             </a:endParaRPr>
           </a:p>
           <a:p>
-            <a:pPr marL="0" indent="0">
-              <a:lnSpc>
-                <a:spcPct val="100000"/>
-              </a:lnSpc>
-              <a:spcBef>
-                <a:spcPts val="600"/>
-              </a:spcBef>
-              <a:buFont typeface="Arial" panose="020B0604020202020204" pitchFamily="34" charset="0"/>
-              <a:buNone/>
+            <a:pPr marL="342900" indent="-342900">
+              <a:lnSpc>
+                <a:spcPct val="100000"/>
+              </a:lnSpc>
+              <a:spcBef>
+                <a:spcPts val="600"/>
+              </a:spcBef>
+              <a:buFont typeface="Arial" panose="020B0604020202020204" pitchFamily="34" charset="0"/>
+              <a:buAutoNum type="arabicPeriod"/>
             </a:pPr>
             <a:r>
               <a:rPr lang="nl-NL" sz="1800" dirty="0">
                 <a:cs typeface="Courier New" panose="02070309020205020404" pitchFamily="49" charset="0"/>
               </a:rPr>
-              <a:t>Kies het repository voor de Pipeline.</a:t>
-            </a:r>
-          </a:p>
-          <a:p>
-            <a:pPr marL="0" indent="0">
-              <a:lnSpc>
-                <a:spcPct val="100000"/>
-              </a:lnSpc>
-              <a:spcBef>
-                <a:spcPts val="600"/>
-              </a:spcBef>
-              <a:buFont typeface="Arial" panose="020B0604020202020204" pitchFamily="34" charset="0"/>
-              <a:buNone/>
+              <a:t>Kies je repository.</a:t>
+            </a:r>
+          </a:p>
+          <a:p>
+            <a:pPr marL="342900" indent="-342900">
+              <a:lnSpc>
+                <a:spcPct val="100000"/>
+              </a:lnSpc>
+              <a:spcBef>
+                <a:spcPts val="600"/>
+              </a:spcBef>
+              <a:buFont typeface="Arial" panose="020B0604020202020204" pitchFamily="34" charset="0"/>
+              <a:buAutoNum type="arabicPeriod"/>
             </a:pPr>
             <a:endParaRPr lang="nl-NL" sz="1800" dirty="0">
               <a:cs typeface="Courier New" panose="02070309020205020404" pitchFamily="49" charset="0"/>
             </a:endParaRPr>
           </a:p>
           <a:p>
-            <a:pPr marL="0" indent="0">
-              <a:lnSpc>
-                <a:spcPct val="100000"/>
-              </a:lnSpc>
-              <a:spcBef>
-                <a:spcPts val="600"/>
-              </a:spcBef>
-              <a:buFont typeface="Arial" panose="020B0604020202020204" pitchFamily="34" charset="0"/>
-              <a:buNone/>
+            <a:pPr marL="342900" indent="-342900">
+              <a:lnSpc>
+                <a:spcPct val="100000"/>
+              </a:lnSpc>
+              <a:spcBef>
+                <a:spcPts val="600"/>
+              </a:spcBef>
+              <a:buFont typeface="Arial" panose="020B0604020202020204" pitchFamily="34" charset="0"/>
+              <a:buAutoNum type="arabicPeriod"/>
             </a:pPr>
             <a:r>
               <a:rPr lang="nl-NL" sz="1800" dirty="0">
                 <a:cs typeface="Courier New" panose="02070309020205020404" pitchFamily="49" charset="0"/>
               </a:rPr>
-              <a:t>Kies een Pipeline template.</a:t>
-            </a:r>
-          </a:p>
-          <a:p>
-            <a:pPr marL="0" indent="0">
-              <a:lnSpc>
-                <a:spcPct val="100000"/>
-              </a:lnSpc>
-              <a:spcBef>
-                <a:spcPts val="600"/>
-              </a:spcBef>
-              <a:buFont typeface="Arial" panose="020B0604020202020204" pitchFamily="34" charset="0"/>
-              <a:buNone/>
-            </a:pPr>
-            <a:endParaRPr lang="nl-NL" sz="1800" dirty="0">
-              <a:cs typeface="Courier New" panose="02070309020205020404" pitchFamily="49" charset="0"/>
-            </a:endParaRPr>
-          </a:p>
-          <a:p>
-            <a:pPr marL="0" indent="0">
-              <a:lnSpc>
-                <a:spcPct val="100000"/>
-              </a:lnSpc>
-              <a:spcBef>
-                <a:spcPts val="600"/>
-              </a:spcBef>
-              <a:buFont typeface="Arial" panose="020B0604020202020204" pitchFamily="34" charset="0"/>
-              <a:buNone/>
-            </a:pPr>
-            <a:r>
-              <a:rPr lang="nl-NL" sz="1800" dirty="0">
-                <a:cs typeface="Courier New" panose="02070309020205020404" pitchFamily="49" charset="0"/>
-              </a:rPr>
-              <a:t>Of:</a:t>
-            </a:r>
-          </a:p>
-          <a:p>
-            <a:pPr marL="0" indent="0">
-              <a:lnSpc>
-                <a:spcPct val="100000"/>
-              </a:lnSpc>
-              <a:spcBef>
-                <a:spcPts val="600"/>
-              </a:spcBef>
-              <a:buFont typeface="Arial" panose="020B0604020202020204" pitchFamily="34" charset="0"/>
-              <a:buNone/>
-            </a:pPr>
-            <a:endParaRPr lang="nl-NL" sz="1800" dirty="0">
-              <a:cs typeface="Courier New" panose="02070309020205020404" pitchFamily="49" charset="0"/>
-            </a:endParaRPr>
-          </a:p>
-          <a:p>
-            <a:pPr marL="0" indent="0">
-              <a:lnSpc>
-                <a:spcPct val="100000"/>
-              </a:lnSpc>
-              <a:spcBef>
-                <a:spcPts val="600"/>
-              </a:spcBef>
-              <a:buFont typeface="Arial" panose="020B0604020202020204" pitchFamily="34" charset="0"/>
-              <a:buNone/>
-            </a:pPr>
-            <a:r>
-              <a:rPr lang="nl-NL" sz="1800" dirty="0">
-                <a:cs typeface="Courier New" panose="02070309020205020404" pitchFamily="49" charset="0"/>
-              </a:rPr>
-              <a:t>Kies een [</a:t>
-            </a:r>
-            <a:r>
-              <a:rPr lang="nl-NL" sz="1800" dirty="0" err="1">
-                <a:cs typeface="Courier New" panose="02070309020205020404" pitchFamily="49" charset="0"/>
-              </a:rPr>
-              <a:t>Existing</a:t>
-            </a:r>
-            <a:r>
-              <a:rPr lang="nl-NL" sz="1800" dirty="0">
-                <a:cs typeface="Courier New" panose="02070309020205020404" pitchFamily="49" charset="0"/>
-              </a:rPr>
-              <a:t> Azure Pipelines YAML file].</a:t>
-            </a:r>
-          </a:p>
-          <a:p>
-            <a:pPr marL="0" indent="0">
-              <a:lnSpc>
-                <a:spcPct val="100000"/>
-              </a:lnSpc>
-              <a:spcBef>
-                <a:spcPts val="600"/>
-              </a:spcBef>
-              <a:buFont typeface="Arial" panose="020B0604020202020204" pitchFamily="34" charset="0"/>
-              <a:buNone/>
-            </a:pPr>
-            <a:endParaRPr lang="nl-NL" sz="1800" dirty="0">
-              <a:cs typeface="Courier New" panose="02070309020205020404" pitchFamily="49" charset="0"/>
-            </a:endParaRPr>
+              <a:t>Kies een template.</a:t>
+            </a:r>
           </a:p>
           <a:p>
             <a:pPr marL="0" indent="0">
@@ -31016,6 +30920,98 @@
               <a:spcBef>
                 <a:spcPts val="600"/>
               </a:spcBef>
+              <a:buNone/>
+            </a:pPr>
+            <a:endParaRPr lang="nl-NL" sz="1800" dirty="0">
+              <a:cs typeface="Courier New" panose="02070309020205020404" pitchFamily="49" charset="0"/>
+            </a:endParaRPr>
+          </a:p>
+          <a:p>
+            <a:pPr marL="0" indent="0">
+              <a:lnSpc>
+                <a:spcPct val="100000"/>
+              </a:lnSpc>
+              <a:spcBef>
+                <a:spcPts val="600"/>
+              </a:spcBef>
+              <a:buNone/>
+            </a:pPr>
+            <a:r>
+              <a:rPr lang="nl-NL" sz="1800" b="1" dirty="0">
+                <a:cs typeface="Courier New" panose="02070309020205020404" pitchFamily="49" charset="0"/>
+              </a:rPr>
+              <a:t>Summary</a:t>
+            </a:r>
+          </a:p>
+          <a:p>
+            <a:pPr marL="0" indent="0">
+              <a:lnSpc>
+                <a:spcPct val="100000"/>
+              </a:lnSpc>
+              <a:spcBef>
+                <a:spcPts val="600"/>
+              </a:spcBef>
+              <a:buNone/>
+            </a:pPr>
+            <a:r>
+              <a:rPr lang="nl-NL" sz="1800" dirty="0">
+                <a:cs typeface="Courier New" panose="02070309020205020404" pitchFamily="49" charset="0"/>
+              </a:rPr>
+              <a:t>Overzicht dat aangeeft welke pipeline heeft gedraaid en op welke </a:t>
+            </a:r>
+            <a:r>
+              <a:rPr lang="nl-NL" sz="1800" dirty="0" err="1">
+                <a:cs typeface="Courier New" panose="02070309020205020404" pitchFamily="49" charset="0"/>
+              </a:rPr>
+              <a:t>branch</a:t>
+            </a:r>
+            <a:r>
+              <a:rPr lang="nl-NL" sz="1800" dirty="0">
+                <a:cs typeface="Courier New" panose="02070309020205020404" pitchFamily="49" charset="0"/>
+              </a:rPr>
+              <a:t>.</a:t>
+            </a:r>
+          </a:p>
+          <a:p>
+            <a:pPr marL="0" indent="0">
+              <a:lnSpc>
+                <a:spcPct val="100000"/>
+              </a:lnSpc>
+              <a:spcBef>
+                <a:spcPts val="600"/>
+              </a:spcBef>
+              <a:buFont typeface="Arial" panose="020B0604020202020204" pitchFamily="34" charset="0"/>
+              <a:buNone/>
+            </a:pPr>
+            <a:endParaRPr lang="nl-NL" sz="1800" dirty="0">
+              <a:cs typeface="Courier New" panose="02070309020205020404" pitchFamily="49" charset="0"/>
+            </a:endParaRPr>
+          </a:p>
+          <a:p>
+            <a:pPr marL="0" indent="0">
+              <a:lnSpc>
+                <a:spcPct val="100000"/>
+              </a:lnSpc>
+              <a:spcBef>
+                <a:spcPts val="600"/>
+              </a:spcBef>
+              <a:buNone/>
+            </a:pPr>
+            <a:r>
+              <a:rPr lang="nl-NL" sz="1800" dirty="0">
+                <a:cs typeface="Courier New" panose="02070309020205020404" pitchFamily="49" charset="0"/>
+              </a:rPr>
+              <a:t>Onderaan staan jobs waarop je kunt doorklikken.</a:t>
+            </a:r>
+          </a:p>
+          <a:p>
+            <a:pPr marL="0" indent="0">
+              <a:lnSpc>
+                <a:spcPct val="100000"/>
+              </a:lnSpc>
+              <a:spcBef>
+                <a:spcPts val="600"/>
+              </a:spcBef>
               <a:buFont typeface="Arial" panose="020B0604020202020204" pitchFamily="34" charset="0"/>
               <a:buNone/>
             </a:pPr>
@@ -31038,10 +31034,28 @@
               <a:buNone/>
             </a:pPr>
             <a:r>
+              <a:rPr lang="nl-NL" sz="1800" b="1" dirty="0">
+                <a:cs typeface="Courier New" panose="02070309020205020404" pitchFamily="49" charset="0"/>
+              </a:rPr>
+              <a:t>Tests / Code Coverage</a:t>
+            </a:r>
+          </a:p>
+          <a:p>
+            <a:pPr marL="0" indent="0">
+              <a:lnSpc>
+                <a:spcPct val="100000"/>
+              </a:lnSpc>
+              <a:spcBef>
+                <a:spcPts val="600"/>
+              </a:spcBef>
+              <a:buFont typeface="Arial" panose="020B0604020202020204" pitchFamily="34" charset="0"/>
+              <a:buNone/>
+            </a:pPr>
+            <a:r>
               <a:rPr lang="nl-NL" sz="1800" dirty="0">
                 <a:cs typeface="Courier New" panose="02070309020205020404" pitchFamily="49" charset="0"/>
               </a:rPr>
-              <a:t>Onderaan staan de jobs waarop je door kunt klikken.</a:t>
+              <a:t>Resultaten van eventuele unit tests.</a:t>
             </a:r>
           </a:p>
         </p:txBody>
@@ -31861,65 +31875,46 @@
               <a:buNone/>
             </a:pPr>
             <a:r>
+              <a:rPr lang="nl-NL" sz="1800" b="1" dirty="0">
+                <a:cs typeface="Courier New" panose="02070309020205020404" pitchFamily="49" charset="0"/>
+              </a:rPr>
+              <a:t>Instellen via repository:</a:t>
+            </a:r>
+          </a:p>
+          <a:p>
+            <a:pPr>
+              <a:lnSpc>
+                <a:spcPct val="100000"/>
+              </a:lnSpc>
+              <a:spcBef>
+                <a:spcPts val="600"/>
+              </a:spcBef>
+              <a:buFontTx/>
+              <a:buChar char="-"/>
+            </a:pPr>
+            <a:r>
               <a:rPr lang="nl-NL" sz="1800" dirty="0">
                 <a:cs typeface="Courier New" panose="02070309020205020404" pitchFamily="49" charset="0"/>
               </a:rPr>
-              <a:t>Ga naar [Branches] in je </a:t>
-            </a:r>
-            <a:r>
-              <a:rPr lang="nl-NL" sz="1800" dirty="0" err="1">
-                <a:cs typeface="Courier New" panose="02070309020205020404" pitchFamily="49" charset="0"/>
-              </a:rPr>
-              <a:t>repo</a:t>
-            </a:r>
+              <a:t>Ga naar [Branches].</a:t>
+            </a:r>
+          </a:p>
+          <a:p>
+            <a:pPr>
+              <a:lnSpc>
+                <a:spcPct val="100000"/>
+              </a:lnSpc>
+              <a:spcBef>
+                <a:spcPts val="600"/>
+              </a:spcBef>
+              <a:buFontTx/>
+              <a:buChar char="-"/>
+            </a:pPr>
             <a:r>
               <a:rPr lang="nl-NL" sz="1800" dirty="0">
                 <a:cs typeface="Courier New" panose="02070309020205020404" pitchFamily="49" charset="0"/>
               </a:rPr>
-              <a:t>.</a:t>
-            </a:r>
-          </a:p>
-          <a:p>
-            <a:pPr marL="0" indent="0">
-              <a:lnSpc>
-                <a:spcPct val="100000"/>
-              </a:lnSpc>
-              <a:spcBef>
-                <a:spcPts val="600"/>
-              </a:spcBef>
-              <a:buNone/>
-            </a:pPr>
-            <a:endParaRPr lang="nl-NL" sz="1800" dirty="0">
-              <a:cs typeface="Courier New" panose="02070309020205020404" pitchFamily="49" charset="0"/>
-            </a:endParaRPr>
-          </a:p>
-          <a:p>
-            <a:pPr marL="0" indent="0">
-              <a:lnSpc>
-                <a:spcPct val="100000"/>
-              </a:lnSpc>
-              <a:spcBef>
-                <a:spcPts val="600"/>
-              </a:spcBef>
-              <a:buNone/>
-            </a:pPr>
-            <a:r>
-              <a:rPr lang="nl-NL" sz="1800" dirty="0">
-                <a:cs typeface="Courier New" panose="02070309020205020404" pitchFamily="49" charset="0"/>
-              </a:rPr>
-              <a:t>Klik op opties achter een </a:t>
-            </a:r>
-            <a:r>
-              <a:rPr lang="nl-NL" sz="1800" dirty="0" err="1">
-                <a:cs typeface="Courier New" panose="02070309020205020404" pitchFamily="49" charset="0"/>
-              </a:rPr>
-              <a:t>branch</a:t>
-            </a:r>
-            <a:r>
-              <a:rPr lang="nl-NL" sz="1800" dirty="0">
-                <a:cs typeface="Courier New" panose="02070309020205020404" pitchFamily="49" charset="0"/>
-              </a:rPr>
-              <a:t> opties [</a:t>
+              <a:t>Klik op [</a:t>
             </a:r>
             <a:r>
               <a:rPr lang="nl-NL" sz="1800" dirty="0">
@@ -31932,32 +31927,31 @@
               <a:rPr lang="nl-NL" sz="1800" dirty="0">
                 <a:cs typeface="Courier New" panose="02070309020205020404" pitchFamily="49" charset="0"/>
               </a:rPr>
-              <a:t>]</a:t>
-            </a:r>
-          </a:p>
-          <a:p>
-            <a:pPr marL="0" indent="0">
-              <a:lnSpc>
-                <a:spcPct val="100000"/>
-              </a:lnSpc>
-              <a:spcBef>
-                <a:spcPts val="600"/>
-              </a:spcBef>
-              <a:buNone/>
-            </a:pPr>
-            <a:endParaRPr lang="nl-NL" sz="1800" dirty="0">
-              <a:cs typeface="Courier New" panose="02070309020205020404" pitchFamily="49" charset="0"/>
-            </a:endParaRPr>
-          </a:p>
-          <a:p>
-            <a:pPr marL="0" indent="0">
-              <a:lnSpc>
-                <a:spcPct val="100000"/>
-              </a:lnSpc>
-              <a:spcBef>
-                <a:spcPts val="600"/>
-              </a:spcBef>
-              <a:buNone/>
+              <a:t>] achter een </a:t>
+            </a:r>
+            <a:r>
+              <a:rPr lang="nl-NL" sz="1800" dirty="0" err="1">
+                <a:cs typeface="Courier New" panose="02070309020205020404" pitchFamily="49" charset="0"/>
+              </a:rPr>
+              <a:t>branch</a:t>
+            </a:r>
+            <a:r>
+              <a:rPr lang="nl-NL" sz="1800" dirty="0">
+                <a:cs typeface="Courier New" panose="02070309020205020404" pitchFamily="49" charset="0"/>
+              </a:rPr>
+              <a:t>.</a:t>
+            </a:r>
+          </a:p>
+          <a:p>
+            <a:pPr>
+              <a:lnSpc>
+                <a:spcPct val="100000"/>
+              </a:lnSpc>
+              <a:spcBef>
+                <a:spcPts val="600"/>
+              </a:spcBef>
+              <a:buFontTx/>
+              <a:buChar char="-"/>
             </a:pPr>
             <a:r>
               <a:rPr lang="nl-NL" sz="1800" dirty="0">
@@ -32003,6 +31997,125 @@
             <a:endParaRPr lang="nl-NL" sz="1800" dirty="0">
               <a:cs typeface="Courier New" panose="02070309020205020404" pitchFamily="49" charset="0"/>
             </a:endParaRPr>
+          </a:p>
+          <a:p>
+            <a:pPr marL="0" indent="0">
+              <a:lnSpc>
+                <a:spcPct val="100000"/>
+              </a:lnSpc>
+              <a:spcBef>
+                <a:spcPts val="600"/>
+              </a:spcBef>
+              <a:buNone/>
+            </a:pPr>
+            <a:r>
+              <a:rPr lang="nl-NL" sz="1800" b="1" dirty="0">
+                <a:cs typeface="Courier New" panose="02070309020205020404" pitchFamily="49" charset="0"/>
+              </a:rPr>
+              <a:t>Instellen via Project </a:t>
+            </a:r>
+            <a:r>
+              <a:rPr lang="nl-NL" sz="1800" b="1" dirty="0" err="1">
+                <a:cs typeface="Courier New" panose="02070309020205020404" pitchFamily="49" charset="0"/>
+              </a:rPr>
+              <a:t>settings</a:t>
+            </a:r>
+            <a:r>
+              <a:rPr lang="nl-NL" sz="1800" b="1" dirty="0">
+                <a:cs typeface="Courier New" panose="02070309020205020404" pitchFamily="49" charset="0"/>
+              </a:rPr>
+              <a:t>:</a:t>
+            </a:r>
+          </a:p>
+          <a:p>
+            <a:pPr>
+              <a:lnSpc>
+                <a:spcPct val="100000"/>
+              </a:lnSpc>
+              <a:spcBef>
+                <a:spcPts val="600"/>
+              </a:spcBef>
+              <a:buFontTx/>
+              <a:buChar char="-"/>
+            </a:pPr>
+            <a:r>
+              <a:rPr lang="nl-NL" sz="1800" dirty="0">
+                <a:cs typeface="Courier New" panose="02070309020205020404" pitchFamily="49" charset="0"/>
+              </a:rPr>
+              <a:t>Ga naar [Repositories].</a:t>
+            </a:r>
+          </a:p>
+          <a:p>
+            <a:pPr>
+              <a:lnSpc>
+                <a:spcPct val="100000"/>
+              </a:lnSpc>
+              <a:spcBef>
+                <a:spcPts val="600"/>
+              </a:spcBef>
+              <a:buFontTx/>
+              <a:buChar char="-"/>
+            </a:pPr>
+            <a:r>
+              <a:rPr lang="nl-NL" sz="1800" dirty="0">
+                <a:cs typeface="Courier New" panose="02070309020205020404" pitchFamily="49" charset="0"/>
+              </a:rPr>
+              <a:t>Ga naar [</a:t>
+            </a:r>
+            <a:r>
+              <a:rPr lang="nl-NL" sz="1800" dirty="0" err="1">
+                <a:cs typeface="Courier New" panose="02070309020205020404" pitchFamily="49" charset="0"/>
+              </a:rPr>
+              <a:t>Policies</a:t>
+            </a:r>
+            <a:r>
+              <a:rPr lang="nl-NL" sz="1800" dirty="0">
+                <a:cs typeface="Courier New" panose="02070309020205020404" pitchFamily="49" charset="0"/>
+              </a:rPr>
+              <a:t>].</a:t>
+            </a:r>
+          </a:p>
+          <a:p>
+            <a:pPr>
+              <a:lnSpc>
+                <a:spcPct val="100000"/>
+              </a:lnSpc>
+              <a:spcBef>
+                <a:spcPts val="600"/>
+              </a:spcBef>
+              <a:buFontTx/>
+              <a:buChar char="-"/>
+            </a:pPr>
+            <a:r>
+              <a:rPr lang="nl-NL" sz="1800" dirty="0">
+                <a:cs typeface="Courier New" panose="02070309020205020404" pitchFamily="49" charset="0"/>
+              </a:rPr>
+              <a:t>Klik onderaan op [</a:t>
+            </a:r>
+            <a:r>
+              <a:rPr lang="nl-NL" sz="1800" dirty="0" err="1">
+                <a:cs typeface="Courier New" panose="02070309020205020404" pitchFamily="49" charset="0"/>
+              </a:rPr>
+              <a:t>Branch</a:t>
+            </a:r>
+            <a:r>
+              <a:rPr lang="nl-NL" sz="1800" dirty="0">
+                <a:cs typeface="Courier New" panose="02070309020205020404" pitchFamily="49" charset="0"/>
+              </a:rPr>
+              <a:t> </a:t>
+            </a:r>
+            <a:r>
+              <a:rPr lang="nl-NL" sz="1800" dirty="0" err="1">
+                <a:cs typeface="Courier New" panose="02070309020205020404" pitchFamily="49" charset="0"/>
+              </a:rPr>
+              <a:t>Policies</a:t>
+            </a:r>
+            <a:r>
+              <a:rPr lang="nl-NL" sz="1800" dirty="0">
+                <a:cs typeface="Courier New" panose="02070309020205020404" pitchFamily="49" charset="0"/>
+              </a:rPr>
+              <a:t>].</a:t>
+            </a:r>
           </a:p>
           <a:p>
             <a:pPr marL="0" indent="0">
@@ -33094,7 +33207,7 @@
             </a:pPr>
             <a:r>
               <a:rPr lang="nl-NL" sz="2000" dirty="0"/>
-              <a:t>Server neemt alleen nuttige branches over.</a:t>
+              <a:t>Server neemt nuttige branches over.</a:t>
             </a:r>
           </a:p>
         </p:txBody>
@@ -33879,7 +33992,7 @@
             </a:pPr>
             <a:r>
               <a:rPr lang="nl-NL" sz="1400" dirty="0"/>
-              <a:t>Kies: + New </a:t>
+              <a:t>Kies: [+ New </a:t>
             </a:r>
             <a:r>
               <a:rPr lang="nl-NL" sz="1400" dirty="0" err="1"/>
@@ -33887,7 +34000,7 @@
             </a:r>
             <a:r>
               <a:rPr lang="nl-NL" sz="1400" dirty="0"/>
-              <a:t> Item</a:t>
+              <a:t> Item].</a:t>
             </a:r>
           </a:p>
           <a:p>
@@ -34090,23 +34203,7 @@
             </a:pPr>
             <a:r>
               <a:rPr lang="nl-NL" sz="1400" dirty="0"/>
-              <a:t>Kies een </a:t>
-            </a:r>
-            <a:r>
-              <a:rPr lang="nl-NL" sz="1400" dirty="0" err="1"/>
-              <a:t>parent</a:t>
-            </a:r>
-            <a:r>
-              <a:rPr lang="nl-NL" sz="1400" dirty="0"/>
-              <a:t> </a:t>
-            </a:r>
-            <a:r>
-              <a:rPr lang="nl-NL" sz="1400" dirty="0" err="1"/>
-              <a:t>work</a:t>
-            </a:r>
-            <a:r>
-              <a:rPr lang="nl-NL" sz="1400" dirty="0"/>
-              <a:t> item.</a:t>
+              <a:t>Kies een Parent / Child item.</a:t>
             </a:r>
           </a:p>
         </p:txBody>
@@ -35378,7 +35475,7 @@
             </a:pPr>
             <a:r>
               <a:rPr lang="nl-NL" sz="2000" noProof="0" dirty="0"/>
-              <a:t>Via een remote server deel je een repository met anderen.</a:t>
+              <a:t>Deel je repository via een remote server.</a:t>
             </a:r>
           </a:p>
           <a:p>
@@ -35409,13 +35506,8 @@
             </a:pPr>
             <a:r>
               <a:rPr lang="nl-NL" sz="2000" noProof="0" dirty="0"/>
-              <a:t>Azure </a:t>
-            </a:r>
-            <a:r>
-              <a:rPr lang="nl-NL" sz="2000" noProof="0" dirty="0" err="1"/>
-              <a:t>Repos</a:t>
-            </a:r>
-            <a:endParaRPr lang="nl-NL" sz="2000" noProof="0" dirty="0"/>
+              <a:t>Azure DevOps</a:t>
+            </a:r>
           </a:p>
           <a:p>
             <a:pPr>
@@ -35450,7 +35542,7 @@
             </a:pPr>
             <a:r>
               <a:rPr lang="nl-NL" sz="2000" noProof="0" dirty="0"/>
-              <a:t>Niet alleen repositories, maar ook veel andere tools…</a:t>
+              <a:t>Niet alleen repositories, ook veel andere tools…</a:t>
             </a:r>
           </a:p>
           <a:p>

</xml_diff>